<commit_message>
Uitgebreide opdracht voor skill 2.1
</commit_message>
<xml_diff>
--- a/M2/Skill/1-Branches/PowerPoint/les 8git branches.pptx
+++ b/M2/Skill/1-Branches/PowerPoint/les 8git branches.pptx
@@ -2991,6 +2991,30 @@
     </pc:docChg>
   </pc:docChgLst>
   <pc:docChgLst>
+    <pc:chgData name="Dragan Javorac" userId="S::d.javorac@ma-web.nl::913c2858-fb97-4c6e-a42c-b1f1a16b225e" providerId="AD" clId="Web-{258425E5-4C16-47EA-90C4-4C25AE509D14}"/>
+    <pc:docChg chg="modSld">
+      <pc:chgData name="Dragan Javorac" userId="S::d.javorac@ma-web.nl::913c2858-fb97-4c6e-a42c-b1f1a16b225e" providerId="AD" clId="Web-{258425E5-4C16-47EA-90C4-4C25AE509D14}" dt="2021-09-13T11:03:03.348" v="5" actId="20577"/>
+      <pc:docMkLst>
+        <pc:docMk/>
+      </pc:docMkLst>
+      <pc:sldChg chg="modSp">
+        <pc:chgData name="Dragan Javorac" userId="S::d.javorac@ma-web.nl::913c2858-fb97-4c6e-a42c-b1f1a16b225e" providerId="AD" clId="Web-{258425E5-4C16-47EA-90C4-4C25AE509D14}" dt="2021-09-13T11:03:03.348" v="5" actId="20577"/>
+        <pc:sldMkLst>
+          <pc:docMk/>
+          <pc:sldMk cId="0" sldId="260"/>
+        </pc:sldMkLst>
+        <pc:spChg chg="mod">
+          <ac:chgData name="Dragan Javorac" userId="S::d.javorac@ma-web.nl::913c2858-fb97-4c6e-a42c-b1f1a16b225e" providerId="AD" clId="Web-{258425E5-4C16-47EA-90C4-4C25AE509D14}" dt="2021-09-13T11:03:03.348" v="5" actId="20577"/>
+          <ac:spMkLst>
+            <pc:docMk/>
+            <pc:sldMk cId="0" sldId="260"/>
+            <ac:spMk id="78" creationId="{00000000-0000-0000-0000-000000000000}"/>
+          </ac:spMkLst>
+        </pc:spChg>
+      </pc:sldChg>
+    </pc:docChg>
+  </pc:docChgLst>
+  <pc:docChgLst>
     <pc:chgData name="Dragan Javorac" userId="913c2858-fb97-4c6e-a42c-b1f1a16b225e" providerId="ADAL" clId="{5AC97985-0A90-4BAD-81FB-88F74D5EE673}"/>
     <pc:docChg chg="modSld modMainMaster">
       <pc:chgData name="Dragan Javorac" userId="913c2858-fb97-4c6e-a42c-b1f1a16b225e" providerId="ADAL" clId="{5AC97985-0A90-4BAD-81FB-88F74D5EE673}" dt="2022-09-12T12:06:47.423" v="80"/>
@@ -3091,30 +3115,6 @@
           </pc:sldLayoutMkLst>
         </pc:sldLayoutChg>
       </pc:sldMasterChg>
-    </pc:docChg>
-  </pc:docChgLst>
-  <pc:docChgLst>
-    <pc:chgData name="Dragan Javorac" userId="S::d.javorac@ma-web.nl::913c2858-fb97-4c6e-a42c-b1f1a16b225e" providerId="AD" clId="Web-{258425E5-4C16-47EA-90C4-4C25AE509D14}"/>
-    <pc:docChg chg="modSld">
-      <pc:chgData name="Dragan Javorac" userId="S::d.javorac@ma-web.nl::913c2858-fb97-4c6e-a42c-b1f1a16b225e" providerId="AD" clId="Web-{258425E5-4C16-47EA-90C4-4C25AE509D14}" dt="2021-09-13T11:03:03.348" v="5" actId="20577"/>
-      <pc:docMkLst>
-        <pc:docMk/>
-      </pc:docMkLst>
-      <pc:sldChg chg="modSp">
-        <pc:chgData name="Dragan Javorac" userId="S::d.javorac@ma-web.nl::913c2858-fb97-4c6e-a42c-b1f1a16b225e" providerId="AD" clId="Web-{258425E5-4C16-47EA-90C4-4C25AE509D14}" dt="2021-09-13T11:03:03.348" v="5" actId="20577"/>
-        <pc:sldMkLst>
-          <pc:docMk/>
-          <pc:sldMk cId="0" sldId="260"/>
-        </pc:sldMkLst>
-        <pc:spChg chg="mod">
-          <ac:chgData name="Dragan Javorac" userId="S::d.javorac@ma-web.nl::913c2858-fb97-4c6e-a42c-b1f1a16b225e" providerId="AD" clId="Web-{258425E5-4C16-47EA-90C4-4C25AE509D14}" dt="2021-09-13T11:03:03.348" v="5" actId="20577"/>
-          <ac:spMkLst>
-            <pc:docMk/>
-            <pc:sldMk cId="0" sldId="260"/>
-            <ac:spMk id="78" creationId="{00000000-0000-0000-0000-000000000000}"/>
-          </ac:spMkLst>
-        </pc:spChg>
-      </pc:sldChg>
     </pc:docChg>
   </pc:docChgLst>
   <pc:docChgLst>
@@ -3228,6 +3228,22 @@
     </pc:docChg>
   </pc:docChgLst>
   <pc:docChgLst>
+    <pc:chgData name="Bram de Vries" userId="S::32018@ma-web.nl::4a465a1c-bf44-4b44-8c1b-d17b3d3bc55c" providerId="AD" clId="Web-{0653E803-6DA8-159F-A8E1-4BA24DF9782E}"/>
+    <pc:docChg chg="sldOrd">
+      <pc:chgData name="Bram de Vries" userId="S::32018@ma-web.nl::4a465a1c-bf44-4b44-8c1b-d17b3d3bc55c" providerId="AD" clId="Web-{0653E803-6DA8-159F-A8E1-4BA24DF9782E}" dt="2020-09-22T13:10:34.837" v="0"/>
+      <pc:docMkLst>
+        <pc:docMk/>
+      </pc:docMkLst>
+      <pc:sldChg chg="ord">
+        <pc:chgData name="Bram de Vries" userId="S::32018@ma-web.nl::4a465a1c-bf44-4b44-8c1b-d17b3d3bc55c" providerId="AD" clId="Web-{0653E803-6DA8-159F-A8E1-4BA24DF9782E}" dt="2020-09-22T13:10:34.837" v="0"/>
+        <pc:sldMkLst>
+          <pc:docMk/>
+          <pc:sldMk cId="3498386614" sldId="280"/>
+        </pc:sldMkLst>
+      </pc:sldChg>
+    </pc:docChg>
+  </pc:docChgLst>
+  <pc:docChgLst>
     <pc:chgData name="Rick Dohmen" userId="S::30476@ma-web.nl::b09bd7e2-1d9e-4809-8adf-28d02244fbfb" providerId="AD" clId="Web-{CFB8AEF8-2481-44E7-841A-B56EE42CE31E}"/>
     <pc:docChg chg="sldOrd">
       <pc:chgData name="Rick Dohmen" userId="S::30476@ma-web.nl::b09bd7e2-1d9e-4809-8adf-28d02244fbfb" providerId="AD" clId="Web-{CFB8AEF8-2481-44E7-841A-B56EE42CE31E}" dt="2020-09-22T10:03:27.325" v="1"/>
@@ -3239,22 +3255,6 @@
         <pc:sldMkLst>
           <pc:docMk/>
           <pc:sldMk cId="0" sldId="278"/>
-        </pc:sldMkLst>
-      </pc:sldChg>
-    </pc:docChg>
-  </pc:docChgLst>
-  <pc:docChgLst>
-    <pc:chgData name="Bram de Vries" userId="S::32018@ma-web.nl::4a465a1c-bf44-4b44-8c1b-d17b3d3bc55c" providerId="AD" clId="Web-{0653E803-6DA8-159F-A8E1-4BA24DF9782E}"/>
-    <pc:docChg chg="sldOrd">
-      <pc:chgData name="Bram de Vries" userId="S::32018@ma-web.nl::4a465a1c-bf44-4b44-8c1b-d17b3d3bc55c" providerId="AD" clId="Web-{0653E803-6DA8-159F-A8E1-4BA24DF9782E}" dt="2020-09-22T13:10:34.837" v="0"/>
-      <pc:docMkLst>
-        <pc:docMk/>
-      </pc:docMkLst>
-      <pc:sldChg chg="ord">
-        <pc:chgData name="Bram de Vries" userId="S::32018@ma-web.nl::4a465a1c-bf44-4b44-8c1b-d17b3d3bc55c" providerId="AD" clId="Web-{0653E803-6DA8-159F-A8E1-4BA24DF9782E}" dt="2020-09-22T13:10:34.837" v="0"/>
-        <pc:sldMkLst>
-          <pc:docMk/>
-          <pc:sldMk cId="3498386614" sldId="280"/>
         </pc:sldMkLst>
       </pc:sldChg>
     </pc:docChg>
@@ -3353,6 +3353,22 @@
     </pc:docChg>
   </pc:docChgLst>
   <pc:docChgLst>
+    <pc:chgData name="Kilian Rijks" userId="S::30697@ma-web.nl::f8ce6190-20f5-4f44-ad1c-c5dcb23f9695" providerId="AD" clId="Web-{D02C8E39-8AB5-45AA-A943-2F33A4BAEB8E}"/>
+    <pc:docChg chg="sldOrd">
+      <pc:chgData name="Kilian Rijks" userId="S::30697@ma-web.nl::f8ce6190-20f5-4f44-ad1c-c5dcb23f9695" providerId="AD" clId="Web-{D02C8E39-8AB5-45AA-A943-2F33A4BAEB8E}" dt="2020-09-22T12:28:56.255" v="0"/>
+      <pc:docMkLst>
+        <pc:docMk/>
+      </pc:docMkLst>
+      <pc:sldChg chg="ord">
+        <pc:chgData name="Kilian Rijks" userId="S::30697@ma-web.nl::f8ce6190-20f5-4f44-ad1c-c5dcb23f9695" providerId="AD" clId="Web-{D02C8E39-8AB5-45AA-A943-2F33A4BAEB8E}" dt="2020-09-22T12:28:56.255" v="0"/>
+        <pc:sldMkLst>
+          <pc:docMk/>
+          <pc:sldMk cId="3498386614" sldId="280"/>
+        </pc:sldMkLst>
+      </pc:sldChg>
+    </pc:docChg>
+  </pc:docChgLst>
+  <pc:docChgLst>
     <pc:chgData name="Sam Derakhshandeh" userId="S::27741@ma-web.nl::25dbf886-86ce-40a8-a7a4-33199b4fd093" providerId="AD" clId="Web-{A15E7CBA-987D-4FC5-806E-9C0674420E45}"/>
     <pc:docChg chg="modSld">
       <pc:chgData name="Sam Derakhshandeh" userId="S::27741@ma-web.nl::25dbf886-86ce-40a8-a7a4-33199b4fd093" providerId="AD" clId="Web-{A15E7CBA-987D-4FC5-806E-9C0674420E45}" dt="2020-09-22T12:27:39.317" v="0" actId="1076"/>
@@ -3373,22 +3389,6 @@
             <ac:spMk id="211" creationId="{00000000-0000-0000-0000-000000000000}"/>
           </ac:spMkLst>
         </pc:spChg>
-      </pc:sldChg>
-    </pc:docChg>
-  </pc:docChgLst>
-  <pc:docChgLst>
-    <pc:chgData name="Kilian Rijks" userId="S::30697@ma-web.nl::f8ce6190-20f5-4f44-ad1c-c5dcb23f9695" providerId="AD" clId="Web-{D02C8E39-8AB5-45AA-A943-2F33A4BAEB8E}"/>
-    <pc:docChg chg="sldOrd">
-      <pc:chgData name="Kilian Rijks" userId="S::30697@ma-web.nl::f8ce6190-20f5-4f44-ad1c-c5dcb23f9695" providerId="AD" clId="Web-{D02C8E39-8AB5-45AA-A943-2F33A4BAEB8E}" dt="2020-09-22T12:28:56.255" v="0"/>
-      <pc:docMkLst>
-        <pc:docMk/>
-      </pc:docMkLst>
-      <pc:sldChg chg="ord">
-        <pc:chgData name="Kilian Rijks" userId="S::30697@ma-web.nl::f8ce6190-20f5-4f44-ad1c-c5dcb23f9695" providerId="AD" clId="Web-{D02C8E39-8AB5-45AA-A943-2F33A4BAEB8E}" dt="2020-09-22T12:28:56.255" v="0"/>
-        <pc:sldMkLst>
-          <pc:docMk/>
-          <pc:sldMk cId="3498386614" sldId="280"/>
-        </pc:sldMkLst>
       </pc:sldChg>
     </pc:docChg>
   </pc:docChgLst>
@@ -11882,7 +11882,12 @@
             <p:ph type="body" idx="1"/>
           </p:nvPr>
         </p:nvSpPr>
-        <p:spPr/>
+        <p:spPr>
+          <a:xfrm>
+            <a:off x="311700" y="1152475"/>
+            <a:ext cx="6367006" cy="3416400"/>
+          </a:xfrm>
+        </p:spPr>
         <p:txBody>
           <a:bodyPr/>
           <a:lstStyle/>
@@ -11892,7 +11897,31 @@
             </a:pPr>
             <a:r>
               <a:rPr lang="en-US" dirty="0"/>
-              <a:t>Open </a:t>
+              <a:t>In </a:t>
+            </a:r>
+            <a:r>
+              <a:rPr lang="en-US" dirty="0" err="1"/>
+              <a:t>Simulise</a:t>
+            </a:r>
+            <a:r>
+              <a:rPr lang="en-US" dirty="0"/>
+              <a:t> </a:t>
+            </a:r>
+            <a:r>
+              <a:rPr lang="en-US" dirty="0" err="1"/>
+              <a:t>staat</a:t>
+            </a:r>
+            <a:r>
+              <a:rPr lang="en-US" dirty="0"/>
+              <a:t> de </a:t>
+            </a:r>
+            <a:r>
+              <a:rPr lang="en-US" dirty="0" err="1"/>
+              <a:t>volgende</a:t>
+            </a:r>
+            <a:r>
+              <a:rPr lang="en-US" dirty="0"/>
+              <a:t> </a:t>
             </a:r>
             <a:r>
               <a:rPr lang="en-US" dirty="0" err="1"/>
@@ -11900,7 +11929,16 @@
             </a:r>
             <a:r>
               <a:rPr lang="en-US" dirty="0"/>
-              <a:t> m2.1branches.zip</a:t>
+              <a:t>:</a:t>
+            </a:r>
+          </a:p>
+          <a:p>
+            <a:pPr marL="139700" indent="0">
+              <a:buNone/>
+            </a:pPr>
+            <a:r>
+              <a:rPr lang="en-US" dirty="0"/>
+              <a:t>SD - M2 - SKILL 2.1 branches</a:t>
             </a:r>
           </a:p>
           <a:p>
@@ -11914,47 +11952,8 @@
               <a:buNone/>
             </a:pPr>
             <a:r>
-              <a:rPr lang="en-US" dirty="0" err="1"/>
-              <a:t>Hierin</a:t>
-            </a:r>
-            <a:r>
-              <a:rPr lang="en-US" dirty="0"/>
-              <a:t> </a:t>
-            </a:r>
-            <a:r>
-              <a:rPr lang="en-US" dirty="0" err="1"/>
-              <a:t>staan</a:t>
-            </a:r>
-            <a:r>
-              <a:rPr lang="en-US" dirty="0"/>
-              <a:t> </a:t>
-            </a:r>
-          </a:p>
-          <a:p>
-            <a:r>
-              <a:rPr lang="en-US" dirty="0"/>
-              <a:t>README.md</a:t>
-            </a:r>
-          </a:p>
-          <a:p>
-            <a:r>
-              <a:rPr lang="en-US" dirty="0"/>
-              <a:t>index.html</a:t>
-            </a:r>
-          </a:p>
-          <a:p>
-            <a:r>
-              <a:rPr lang="en-US" dirty="0"/>
-              <a:t>style.css</a:t>
-            </a:r>
-          </a:p>
-          <a:p>
-            <a:pPr marL="139700" indent="0">
-              <a:buNone/>
-            </a:pPr>
-            <a:r>
               <a:rPr lang="nl-NL" dirty="0"/>
-              <a:t>”</a:t>
+              <a:t>Hier staat de opdracht in beschreven en vind je de voorbeeld bestanden.</a:t>
             </a:r>
           </a:p>
           <a:p>
@@ -12090,7 +12089,7 @@
             </a:pPr>
             <a:r>
               <a:rPr lang="nl-NL" dirty="0"/>
-              <a:t>Maak een directory en plaats deze bestanden hierin</a:t>
+              <a:t>Maak een directory en plaats de bestanden uit deze opdracht hierin</a:t>
             </a:r>
           </a:p>
           <a:p>
@@ -12100,7 +12099,15 @@
             </a:pPr>
             <a:r>
               <a:rPr lang="nl-NL" dirty="0"/>
-              <a:t>Voeg aan de directory een lokale repository toe</a:t>
+              <a:t>Voeg aan de directory een lokale </a:t>
+            </a:r>
+            <a:r>
+              <a:rPr lang="nl-NL" dirty="0" err="1"/>
+              <a:t>repository</a:t>
+            </a:r>
+            <a:r>
+              <a:rPr lang="nl-NL" dirty="0"/>
+              <a:t> toe</a:t>
             </a:r>
           </a:p>
           <a:p>
@@ -12110,7 +12117,23 @@
             </a:pPr>
             <a:r>
               <a:rPr lang="nl-NL" dirty="0"/>
-              <a:t>Zorg dat de beginbranch ‘main” heet</a:t>
+              <a:t>Zorg dat de </a:t>
+            </a:r>
+            <a:r>
+              <a:rPr lang="nl-NL" dirty="0" err="1"/>
+              <a:t>beginbranch</a:t>
+            </a:r>
+            <a:r>
+              <a:rPr lang="nl-NL" dirty="0"/>
+              <a:t> </a:t>
+            </a:r>
+            <a:r>
+              <a:rPr lang="nl-NL" dirty="0" err="1"/>
+              <a:t>main</a:t>
+            </a:r>
+            <a:r>
+              <a:rPr lang="nl-NL" dirty="0"/>
+              <a:t> heet</a:t>
             </a:r>
           </a:p>
           <a:p>
@@ -12120,7 +12143,27 @@
             </a:pPr>
             <a:r>
               <a:rPr lang="nl-NL" dirty="0"/>
-              <a:t>Plaats de bestanden op de stage</a:t>
+              <a:t>Plaats de bestanden op de stage </a:t>
+            </a:r>
+            <a:r>
+              <a:rPr lang="nl-NL" i="1" dirty="0"/>
+              <a:t>( plaats er een paar bestanden in via de </a:t>
+            </a:r>
+            <a:r>
+              <a:rPr lang="nl-NL" b="1" i="1" dirty="0"/>
+              <a:t>verkenner</a:t>
+            </a:r>
+            <a:r>
+              <a:rPr lang="nl-NL" i="1" dirty="0"/>
+              <a:t> / </a:t>
+            </a:r>
+            <a:r>
+              <a:rPr lang="nl-NL" b="1" i="1" dirty="0" err="1"/>
+              <a:t>finder</a:t>
+            </a:r>
+            <a:r>
+              <a:rPr lang="nl-NL" i="1" dirty="0"/>
+              <a:t>  )</a:t>
             </a:r>
           </a:p>
           <a:p>
@@ -12129,8 +12172,20 @@
               <a:buAutoNum type="arabicPeriod"/>
             </a:pPr>
             <a:r>
+              <a:rPr lang="nl-NL" dirty="0" err="1"/>
+              <a:t>Commit</a:t>
+            </a:r>
+            <a:r>
               <a:rPr lang="nl-NL" dirty="0"/>
-              <a:t>Commit de bestanden onder de naam “first commit”</a:t>
+              <a:t> de bestanden onder de naam “first </a:t>
+            </a:r>
+            <a:r>
+              <a:rPr lang="nl-NL" dirty="0" err="1"/>
+              <a:t>commit</a:t>
+            </a:r>
+            <a:r>
+              <a:rPr lang="nl-NL" dirty="0"/>
+              <a:t>”</a:t>
             </a:r>
           </a:p>
           <a:p>
@@ -12140,7 +12195,15 @@
             </a:pPr>
             <a:r>
               <a:rPr lang="nl-NL" dirty="0"/>
-              <a:t>Maak een online repository met als naam “skill2-1 en push de repository daar heen</a:t>
+              <a:t>Maak een online </a:t>
+            </a:r>
+            <a:r>
+              <a:rPr lang="nl-NL" dirty="0" err="1"/>
+              <a:t>repository</a:t>
+            </a:r>
+            <a:r>
+              <a:rPr lang="nl-NL" dirty="0"/>
+              <a:t> met als naam skill2-1</a:t>
             </a:r>
           </a:p>
           <a:p>
@@ -12150,7 +12213,39 @@
             </a:pPr>
             <a:r>
               <a:rPr lang="nl-NL" dirty="0"/>
-              <a:t>Maak een nieuwe branch “zakelijk” check deze uit en vervang de style.css door de style.css in de map zakelijk. Voeg dit toe aan de stage, commit het onder naam “zakelijk” en push dit naar de online repository</a:t>
+              <a:t>Koppel deze </a:t>
+            </a:r>
+            <a:r>
+              <a:rPr lang="nl-NL" dirty="0" err="1"/>
+              <a:t>repository</a:t>
+            </a:r>
+            <a:r>
+              <a:rPr lang="nl-NL" dirty="0"/>
+              <a:t> aan jouw lokale git: git remote </a:t>
+            </a:r>
+            <a:r>
+              <a:rPr lang="nl-NL" dirty="0" err="1"/>
+              <a:t>add</a:t>
+            </a:r>
+            <a:r>
+              <a:rPr lang="nl-NL" dirty="0"/>
+              <a:t> </a:t>
+            </a:r>
+            <a:r>
+              <a:rPr lang="nl-NL" dirty="0" err="1"/>
+              <a:t>origin</a:t>
+            </a:r>
+            <a:r>
+              <a:rPr lang="nl-NL" dirty="0"/>
+              <a:t> </a:t>
+            </a:r>
+            <a:r>
+              <a:rPr lang="nl-NL" dirty="0" err="1"/>
+              <a:t>git@github.com:XXXXX</a:t>
+            </a:r>
+            <a:r>
+              <a:rPr lang="nl-NL" dirty="0"/>
+              <a:t>/skill2-1.git</a:t>
             </a:r>
           </a:p>
           <a:p>
@@ -12160,7 +12255,15 @@
             </a:pPr>
             <a:r>
               <a:rPr lang="nl-NL" dirty="0"/>
-              <a:t>Maak een nieuwe repository “vrolijk”, check deze uit en vervang de style.css door de style.css uit het mapje vrolijk en push dit naar github</a:t>
+              <a:t>Push jouw </a:t>
+            </a:r>
+            <a:r>
+              <a:rPr lang="nl-NL" dirty="0" err="1"/>
+              <a:t>repository</a:t>
+            </a:r>
+            <a:r>
+              <a:rPr lang="nl-NL" dirty="0"/>
+              <a:t> daar heen</a:t>
             </a:r>
           </a:p>
           <a:p>
@@ -12170,7 +12273,31 @@
             </a:pPr>
             <a:r>
               <a:rPr lang="nl-NL" dirty="0"/>
-              <a:t>Kies een van beide branches en merge deze met de branch main. Ook dit weer pushen naar de online repository</a:t>
+              <a:t>Maak een nieuwe </a:t>
+            </a:r>
+            <a:r>
+              <a:rPr lang="nl-NL" dirty="0" err="1"/>
+              <a:t>branch</a:t>
+            </a:r>
+            <a:r>
+              <a:rPr lang="nl-NL" dirty="0"/>
+              <a:t> “zakelijk” check deze uit en vervang de </a:t>
+            </a:r>
+            <a:r>
+              <a:rPr lang="nl-NL" dirty="0" err="1"/>
+              <a:t>style.css</a:t>
+            </a:r>
+            <a:r>
+              <a:rPr lang="nl-NL" dirty="0"/>
+              <a:t> door de </a:t>
+            </a:r>
+            <a:r>
+              <a:rPr lang="nl-NL" dirty="0" err="1"/>
+              <a:t>style.css</a:t>
+            </a:r>
+            <a:r>
+              <a:rPr lang="nl-NL" dirty="0"/>
+              <a:t> uit de map zakelijk.</a:t>
             </a:r>
           </a:p>
           <a:p>
@@ -12180,7 +12307,134 @@
             </a:pPr>
             <a:r>
               <a:rPr lang="nl-NL" dirty="0"/>
-              <a:t>Lever de URL van deze repository in bij Simulise.</a:t>
+              <a:t>Voeg dit toe aan de stage, </a:t>
+            </a:r>
+            <a:r>
+              <a:rPr lang="nl-NL" dirty="0" err="1"/>
+              <a:t>commit</a:t>
+            </a:r>
+            <a:r>
+              <a:rPr lang="nl-NL" dirty="0"/>
+              <a:t> het onder naam “zakelijk” en push dit naar de online </a:t>
+            </a:r>
+            <a:r>
+              <a:rPr lang="nl-NL" dirty="0" err="1"/>
+              <a:t>repository</a:t>
+            </a:r>
+            <a:endParaRPr lang="nl-NL" dirty="0"/>
+          </a:p>
+          <a:p>
+            <a:pPr marL="482600" indent="-342900">
+              <a:buFont typeface="+mj-lt"/>
+              <a:buAutoNum type="arabicPeriod"/>
+            </a:pPr>
+            <a:r>
+              <a:rPr lang="nl-NL" dirty="0"/>
+              <a:t>Maak een nieuwe </a:t>
+            </a:r>
+            <a:r>
+              <a:rPr lang="nl-NL" dirty="0" err="1"/>
+              <a:t>branch</a:t>
+            </a:r>
+            <a:r>
+              <a:rPr lang="nl-NL" dirty="0"/>
+              <a:t> “vrolijk”, check deze uit en vervang de </a:t>
+            </a:r>
+            <a:r>
+              <a:rPr lang="nl-NL" dirty="0" err="1"/>
+              <a:t>style.css</a:t>
+            </a:r>
+            <a:r>
+              <a:rPr lang="nl-NL" dirty="0"/>
+              <a:t> door de </a:t>
+            </a:r>
+            <a:r>
+              <a:rPr lang="nl-NL" dirty="0" err="1"/>
+              <a:t>style.css</a:t>
+            </a:r>
+            <a:r>
+              <a:rPr lang="nl-NL" dirty="0"/>
+              <a:t> uit het mapje vrolijk en push dit naar </a:t>
+            </a:r>
+            <a:r>
+              <a:rPr lang="nl-NL" dirty="0" err="1"/>
+              <a:t>github</a:t>
+            </a:r>
+            <a:endParaRPr lang="nl-NL" dirty="0"/>
+          </a:p>
+          <a:p>
+            <a:pPr marL="482600" indent="-342900">
+              <a:buFont typeface="+mj-lt"/>
+              <a:buAutoNum type="arabicPeriod"/>
+            </a:pPr>
+            <a:r>
+              <a:rPr lang="nl-NL" dirty="0"/>
+              <a:t>Kies een van beide branches en </a:t>
+            </a:r>
+            <a:r>
+              <a:rPr lang="nl-NL" dirty="0" err="1"/>
+              <a:t>merge</a:t>
+            </a:r>
+            <a:r>
+              <a:rPr lang="nl-NL" dirty="0"/>
+              <a:t> deze met de </a:t>
+            </a:r>
+            <a:r>
+              <a:rPr lang="nl-NL" dirty="0" err="1"/>
+              <a:t>branch</a:t>
+            </a:r>
+            <a:r>
+              <a:rPr lang="nl-NL" dirty="0"/>
+              <a:t> </a:t>
+            </a:r>
+            <a:r>
+              <a:rPr lang="nl-NL" dirty="0" err="1"/>
+              <a:t>main</a:t>
+            </a:r>
+            <a:r>
+              <a:rPr lang="nl-NL" dirty="0"/>
+              <a:t>.</a:t>
+            </a:r>
+          </a:p>
+          <a:p>
+            <a:pPr marL="482600" indent="-342900">
+              <a:buFont typeface="+mj-lt"/>
+              <a:buAutoNum type="arabicPeriod"/>
+            </a:pPr>
+            <a:r>
+              <a:rPr lang="nl-NL" dirty="0"/>
+              <a:t>Ook dit weer pushen naar de online </a:t>
+            </a:r>
+            <a:r>
+              <a:rPr lang="nl-NL" dirty="0" err="1"/>
+              <a:t>repository</a:t>
+            </a:r>
+            <a:endParaRPr lang="nl-NL" dirty="0"/>
+          </a:p>
+          <a:p>
+            <a:pPr marL="482600" indent="-342900">
+              <a:buFont typeface="+mj-lt"/>
+              <a:buAutoNum type="arabicPeriod"/>
+            </a:pPr>
+            <a:r>
+              <a:rPr lang="nl-NL" dirty="0"/>
+              <a:t>Lever de URL van deze </a:t>
+            </a:r>
+            <a:r>
+              <a:rPr lang="nl-NL" dirty="0" err="1"/>
+              <a:t>repository</a:t>
+            </a:r>
+            <a:r>
+              <a:rPr lang="nl-NL" dirty="0"/>
+              <a:t> in bij </a:t>
+            </a:r>
+            <a:r>
+              <a:rPr lang="nl-NL" dirty="0" err="1"/>
+              <a:t>Simulise</a:t>
+            </a:r>
+            <a:r>
+              <a:rPr lang="nl-NL" dirty="0"/>
+              <a:t>.</a:t>
             </a:r>
           </a:p>
           <a:p>
@@ -12195,6 +12449,116 @@
               <a:buFont typeface="+mj-lt"/>
               <a:buAutoNum type="arabicPeriod"/>
             </a:pPr>
+            <a:endParaRPr lang="nl-NL" dirty="0"/>
+          </a:p>
+          <a:p>
+            <a:pPr marL="482600" indent="-342900">
+              <a:buFont typeface="+mj-lt"/>
+              <a:buAutoNum type="arabicPeriod"/>
+            </a:pPr>
+            <a:r>
+              <a:rPr lang="nl-NL" dirty="0"/>
+              <a:t>Opdracht materiaal</a:t>
+            </a:r>
+          </a:p>
+          <a:p>
+            <a:pPr marL="482600" indent="-342900">
+              <a:buFont typeface="+mj-lt"/>
+              <a:buAutoNum type="arabicPeriod"/>
+            </a:pPr>
+            <a:endParaRPr lang="nl-NL" dirty="0"/>
+          </a:p>
+          <a:p>
+            <a:pPr marL="482600" indent="-342900">
+              <a:buFont typeface="+mj-lt"/>
+              <a:buAutoNum type="arabicPeriod"/>
+            </a:pPr>
+            <a:r>
+              <a:rPr lang="nl-NL" dirty="0"/>
+              <a:t>In de bijlage vind je opdracht m2.1branches.zip</a:t>
+            </a:r>
+          </a:p>
+          <a:p>
+            <a:pPr marL="482600" indent="-342900">
+              <a:buFont typeface="+mj-lt"/>
+              <a:buAutoNum type="arabicPeriod"/>
+            </a:pPr>
+            <a:endParaRPr lang="nl-NL" dirty="0"/>
+          </a:p>
+          <a:p>
+            <a:pPr marL="482600" indent="-342900">
+              <a:buFont typeface="+mj-lt"/>
+              <a:buAutoNum type="arabicPeriod"/>
+            </a:pPr>
+            <a:r>
+              <a:rPr lang="nl-NL" dirty="0"/>
+              <a:t>Hierin staan:</a:t>
+            </a:r>
+          </a:p>
+          <a:p>
+            <a:pPr marL="482600" indent="-342900">
+              <a:buFont typeface="+mj-lt"/>
+              <a:buAutoNum type="arabicPeriod"/>
+            </a:pPr>
+            <a:endParaRPr lang="nl-NL" dirty="0"/>
+          </a:p>
+          <a:p>
+            <a:pPr marL="482600" indent="-342900">
+              <a:buFont typeface="+mj-lt"/>
+              <a:buAutoNum type="arabicPeriod"/>
+            </a:pPr>
+            <a:r>
+              <a:rPr lang="nl-NL" dirty="0"/>
+              <a:t>- </a:t>
+            </a:r>
+            <a:r>
+              <a:rPr lang="nl-NL" dirty="0" err="1"/>
+              <a:t>README.md</a:t>
+            </a:r>
+            <a:endParaRPr lang="nl-NL" dirty="0"/>
+          </a:p>
+          <a:p>
+            <a:pPr marL="482600" indent="-342900">
+              <a:buFont typeface="+mj-lt"/>
+              <a:buAutoNum type="arabicPeriod"/>
+            </a:pPr>
+            <a:endParaRPr lang="nl-NL" dirty="0"/>
+          </a:p>
+          <a:p>
+            <a:pPr marL="482600" indent="-342900">
+              <a:buFont typeface="+mj-lt"/>
+              <a:buAutoNum type="arabicPeriod"/>
+            </a:pPr>
+            <a:r>
+              <a:rPr lang="nl-NL" dirty="0"/>
+              <a:t>- </a:t>
+            </a:r>
+            <a:r>
+              <a:rPr lang="nl-NL" dirty="0" err="1"/>
+              <a:t>index.html</a:t>
+            </a:r>
+            <a:endParaRPr lang="nl-NL" dirty="0"/>
+          </a:p>
+          <a:p>
+            <a:pPr marL="482600" indent="-342900">
+              <a:buFont typeface="+mj-lt"/>
+              <a:buAutoNum type="arabicPeriod"/>
+            </a:pPr>
+            <a:endParaRPr lang="nl-NL" dirty="0"/>
+          </a:p>
+          <a:p>
+            <a:pPr marL="482600" indent="-342900">
+              <a:buFont typeface="+mj-lt"/>
+              <a:buAutoNum type="arabicPeriod"/>
+            </a:pPr>
+            <a:r>
+              <a:rPr lang="nl-NL" dirty="0"/>
+              <a:t>- </a:t>
+            </a:r>
+            <a:r>
+              <a:rPr lang="nl-NL" dirty="0" err="1"/>
+              <a:t>style.css</a:t>
+            </a:r>
             <a:endParaRPr lang="nl-NL" dirty="0"/>
           </a:p>
           <a:p>
@@ -15332,18 +15696,18 @@
 </file>
 
 <file path=customXml/item1.xml><?xml version="1.0" encoding="utf-8"?>
-<p:properties xmlns:p="http://schemas.microsoft.com/office/2006/metadata/properties" xmlns:xsi="http://www.w3.org/2001/XMLSchema-instance" xmlns:pc="http://schemas.microsoft.com/office/infopath/2007/PartnerControls">
-  <documentManagement/>
-</p:properties>
-</file>
-
-<file path=customXml/item2.xml><?xml version="1.0" encoding="utf-8"?>
 <?mso-contentType ?>
 <FormTemplates xmlns="http://schemas.microsoft.com/sharepoint/v3/contenttype/forms">
   <Display>DocumentLibraryForm</Display>
   <Edit>DocumentLibraryForm</Edit>
   <New>DocumentLibraryForm</New>
 </FormTemplates>
+</file>
+
+<file path=customXml/item2.xml><?xml version="1.0" encoding="utf-8"?>
+<p:properties xmlns:p="http://schemas.microsoft.com/office/2006/metadata/properties" xmlns:xsi="http://www.w3.org/2001/XMLSchema-instance" xmlns:pc="http://schemas.microsoft.com/office/infopath/2007/PartnerControls">
+  <documentManagement/>
+</p:properties>
 </file>
 
 <file path=customXml/item3.xml><?xml version="1.0" encoding="utf-8"?>
@@ -15485,6 +15849,14 @@
 </file>
 
 <file path=customXml/itemProps1.xml><?xml version="1.0" encoding="utf-8"?>
+<ds:datastoreItem xmlns:ds="http://schemas.openxmlformats.org/officeDocument/2006/customXml" ds:itemID="{4077D397-A58D-41CD-9DDC-45F29C08B187}">
+  <ds:schemaRefs>
+    <ds:schemaRef ds:uri="http://schemas.microsoft.com/sharepoint/v3/contenttype/forms"/>
+  </ds:schemaRefs>
+</ds:datastoreItem>
+</file>
+
+<file path=customXml/itemProps2.xml><?xml version="1.0" encoding="utf-8"?>
 <ds:datastoreItem xmlns:ds="http://schemas.openxmlformats.org/officeDocument/2006/customXml" ds:itemID="{72B6DE8D-9C4F-42E6-BF5C-BF8BF3BCA2F6}">
   <ds:schemaRefs>
     <ds:schemaRef ds:uri="http://schemas.microsoft.com/office/2006/metadata/properties"/>
@@ -15496,14 +15868,6 @@
     <ds:schemaRef ds:uri="http://schemas.microsoft.com/office/2006/documentManagement/types"/>
     <ds:schemaRef ds:uri="http://schemas.openxmlformats.org/package/2006/metadata/core-properties"/>
     <ds:schemaRef ds:uri="c04f5927-35c1-4460-8063-a663705806d2"/>
-  </ds:schemaRefs>
-</ds:datastoreItem>
-</file>
-
-<file path=customXml/itemProps2.xml><?xml version="1.0" encoding="utf-8"?>
-<ds:datastoreItem xmlns:ds="http://schemas.openxmlformats.org/officeDocument/2006/customXml" ds:itemID="{4077D397-A58D-41CD-9DDC-45F29C08B187}">
-  <ds:schemaRefs>
-    <ds:schemaRef ds:uri="http://schemas.microsoft.com/sharepoint/v3/contenttype/forms"/>
   </ds:schemaRefs>
 </ds:datastoreItem>
 </file>

</xml_diff>